<commit_message>
Updated presentation slides based on conversation with Dr. T.
Related to xwsxethan/MusicScoring#80
</commit_message>
<xml_diff>
--- a/Documents/Thesis/Knapp Meeting.pptx
+++ b/Documents/Thesis/Knapp Meeting.pptx
@@ -7,14 +7,14 @@
   <p:sldIdLst>
     <p:sldId id="256" r:id="rId2"/>
     <p:sldId id="257" r:id="rId3"/>
-    <p:sldId id="269" r:id="rId4"/>
-    <p:sldId id="271" r:id="rId5"/>
-    <p:sldId id="270" r:id="rId6"/>
-    <p:sldId id="268" r:id="rId7"/>
-    <p:sldId id="258" r:id="rId8"/>
-    <p:sldId id="259" r:id="rId9"/>
-    <p:sldId id="264" r:id="rId10"/>
-    <p:sldId id="265" r:id="rId11"/>
+    <p:sldId id="272" r:id="rId4"/>
+    <p:sldId id="269" r:id="rId5"/>
+    <p:sldId id="271" r:id="rId6"/>
+    <p:sldId id="270" r:id="rId7"/>
+    <p:sldId id="268" r:id="rId8"/>
+    <p:sldId id="258" r:id="rId9"/>
+    <p:sldId id="259" r:id="rId10"/>
+    <p:sldId id="264" r:id="rId11"/>
     <p:sldId id="266" r:id="rId12"/>
   </p:sldIdLst>
   <p:sldSz cx="9144000" cy="6858000" type="screen4x3"/>
@@ -5097,6 +5097,17 @@
               <a:rPr lang="en-US" dirty="0" err="1" smtClean="0"/>
               <a:t>Musiplectics</a:t>
             </a:r>
+            <a:r>
+              <a:rPr lang="en-US" dirty="0" smtClean="0"/>
+              <a:t/>
+            </a:r>
+            <a:br>
+              <a:rPr lang="en-US" dirty="0" smtClean="0"/>
+            </a:br>
+            <a:r>
+              <a:rPr lang="en-US" sz="4000" dirty="0"/>
+              <a:t>Computational Assessment of the Complexity of Music Scores </a:t>
+            </a:r>
             <a:endParaRPr lang="en-US" dirty="0"/>
           </a:p>
         </p:txBody>
@@ -5124,7 +5135,7 @@
           <a:p>
             <a:r>
               <a:rPr lang="en-US" dirty="0" smtClean="0"/>
-              <a:t>Eli </a:t>
+              <a:t>Advisor: Eli </a:t>
             </a:r>
             <a:r>
               <a:rPr lang="en-US" dirty="0" err="1" smtClean="0"/>
@@ -5132,15 +5143,38 @@
             </a:r>
             <a:r>
               <a:rPr lang="en-US" dirty="0" smtClean="0"/>
-              <a:t>, Amy </a:t>
+              <a:t> (CS)</a:t>
+            </a:r>
+            <a:endParaRPr lang="en-US" dirty="0"/>
+          </a:p>
+          <a:p>
+            <a:r>
+              <a:rPr lang="en-US" dirty="0" smtClean="0"/>
+              <a:t>Committee Members: Amy </a:t>
             </a:r>
             <a:r>
               <a:rPr lang="en-US" dirty="0" err="1" smtClean="0"/>
               <a:t>Gillick</a:t>
             </a:r>
             <a:r>
-              <a:rPr lang="en-US" dirty="0" smtClean="0"/>
-              <a:t>, R. Ben Knapp</a:t>
+              <a:rPr lang="en-US" dirty="0"/>
+              <a:t> </a:t>
+            </a:r>
+            <a:r>
+              <a:rPr lang="en-US" dirty="0" smtClean="0"/>
+              <a:t>(Music) and</a:t>
+            </a:r>
+            <a:r>
+              <a:rPr lang="en-US" dirty="0" smtClean="0"/>
+              <a:t> </a:t>
+            </a:r>
+            <a:r>
+              <a:rPr lang="en-US" dirty="0" smtClean="0"/>
+              <a:t>R. Ben </a:t>
+            </a:r>
+            <a:r>
+              <a:rPr lang="en-US" dirty="0" smtClean="0"/>
+              <a:t>Knapp (ICAT)</a:t>
             </a:r>
             <a:endParaRPr lang="en-US" dirty="0"/>
           </a:p>
@@ -5193,7 +5227,7 @@
           <a:p>
             <a:r>
               <a:rPr lang="en-US" dirty="0" smtClean="0"/>
-              <a:t>Why is this Cool?</a:t>
+              <a:t>Solution</a:t>
             </a:r>
             <a:endParaRPr lang="en-US" dirty="0"/>
           </a:p>
@@ -5216,45 +5250,81 @@
           <a:p>
             <a:r>
               <a:rPr lang="en-US" dirty="0" smtClean="0"/>
-              <a:t>Hasn’t really been done before. Could become a standard.</a:t>
-            </a:r>
-          </a:p>
-          <a:p>
-            <a:r>
-              <a:rPr lang="en-US" dirty="0" smtClean="0"/>
-              <a:t>Can leverage other research to make the process easier.</a:t>
-            </a:r>
-          </a:p>
-          <a:p>
-            <a:pPr lvl="1"/>
-            <a:r>
-              <a:rPr lang="en-US" dirty="0" smtClean="0"/>
-              <a:t>Music OCR, </a:t>
-            </a:r>
-            <a:r>
-              <a:rPr lang="en-US" dirty="0" smtClean="0"/>
-              <a:t>MIDI </a:t>
-            </a:r>
-            <a:r>
-              <a:rPr lang="en-US" dirty="0" smtClean="0"/>
-              <a:t>conversion, dynamic assessment</a:t>
-            </a:r>
-          </a:p>
-          <a:p>
-            <a:r>
-              <a:rPr lang="en-US" dirty="0"/>
-              <a:t>It isn’t going to save the world, but it makes someone’s job easier.</a:t>
-            </a:r>
-          </a:p>
-          <a:p>
+              <a:t>Give educators and performers an objective means to quickly determine the complexity of a piece of music relative to their own level of play.</a:t>
+            </a:r>
+          </a:p>
+          <a:p>
+            <a:r>
+              <a:rPr lang="en-US" dirty="0">
+                <a:hlinkClick r:id="rId2"/>
+              </a:rPr>
+              <a:t>http://mickey.cs.vt.edu</a:t>
+            </a:r>
+            <a:r>
+              <a:rPr lang="en-US" dirty="0" smtClean="0">
+                <a:hlinkClick r:id="rId2"/>
+              </a:rPr>
+              <a:t>/</a:t>
+            </a:r>
             <a:endParaRPr lang="en-US" dirty="0" smtClean="0"/>
           </a:p>
-        </p:txBody>
-      </p:sp>
+          <a:p>
+            <a:r>
+              <a:rPr lang="en-US" dirty="0">
+                <a:hlinkClick r:id="rId3"/>
+              </a:rPr>
+              <a:t>https://github.com/xwsxethan/</a:t>
+            </a:r>
+            <a:r>
+              <a:rPr lang="en-US" dirty="0" smtClean="0">
+                <a:hlinkClick r:id="rId3"/>
+              </a:rPr>
+              <a:t>MusicScoring</a:t>
+            </a:r>
+            <a:endParaRPr lang="en-US" dirty="0" smtClean="0"/>
+          </a:p>
+          <a:p>
+            <a:endParaRPr lang="en-US" dirty="0" smtClean="0"/>
+          </a:p>
+          <a:p>
+            <a:endParaRPr lang="en-US" dirty="0"/>
+          </a:p>
+        </p:txBody>
+      </p:sp>
+      <p:pic>
+        <p:nvPicPr>
+          <p:cNvPr id="4" name="Picture 3" descr="qrcode.27555132.png"/>
+          <p:cNvPicPr>
+            <a:picLocks noChangeAspect="1"/>
+          </p:cNvPicPr>
+          <p:nvPr/>
+        </p:nvPicPr>
+        <p:blipFill>
+          <a:blip r:embed="rId4">
+            <a:extLst>
+              <a:ext uri="{28A0092B-C50C-407E-A947-70E740481C1C}">
+                <a14:useLocalDpi xmlns:a14="http://schemas.microsoft.com/office/drawing/2010/main" val="0"/>
+              </a:ext>
+            </a:extLst>
+          </a:blip>
+          <a:stretch>
+            <a:fillRect/>
+          </a:stretch>
+        </p:blipFill>
+        <p:spPr>
+          <a:xfrm>
+            <a:off x="3672416" y="5038788"/>
+            <a:ext cx="1819212" cy="1819212"/>
+          </a:xfrm>
+          <a:prstGeom prst="rect">
+            <a:avLst/>
+          </a:prstGeom>
+        </p:spPr>
+      </p:pic>
     </p:spTree>
     <p:extLst>
       <p:ext uri="{BB962C8B-B14F-4D97-AF65-F5344CB8AC3E}">
-        <p14:creationId xmlns:p14="http://schemas.microsoft.com/office/powerpoint/2010/main" val="3494473293"/>
+        <p14:creationId xmlns:p14="http://schemas.microsoft.com/office/powerpoint/2010/main" val="3657676580"/>
       </p:ext>
     </p:extLst>
   </p:cSld>
@@ -5521,21 +5591,27 @@
           <a:p>
             <a:r>
               <a:rPr lang="en-US" dirty="0" smtClean="0"/>
+              <a:t>Insights</a:t>
+            </a:r>
+          </a:p>
+          <a:p>
+            <a:r>
+              <a:rPr lang="en-US" dirty="0" smtClean="0"/>
               <a:t>Overview</a:t>
             </a:r>
             <a:endParaRPr lang="en-US" dirty="0"/>
           </a:p>
           <a:p>
             <a:r>
-              <a:rPr lang="en-US" dirty="0"/>
-              <a:t>Website</a:t>
+              <a:rPr lang="en-US" dirty="0" smtClean="0"/>
+              <a:t>Proof of Concept</a:t>
             </a:r>
             <a:endParaRPr lang="en-US" dirty="0" smtClean="0"/>
           </a:p>
           <a:p>
             <a:r>
               <a:rPr lang="en-US" dirty="0" smtClean="0"/>
-              <a:t>Results</a:t>
+              <a:t>Contributions</a:t>
             </a:r>
             <a:endParaRPr lang="en-US" dirty="0" smtClean="0"/>
           </a:p>
@@ -5572,6 +5648,96 @@
 </file>
 
 <file path=ppt/slides/slide3.xml><?xml version="1.0" encoding="utf-8"?>
+<p:sld xmlns:a="http://schemas.openxmlformats.org/drawingml/2006/main" xmlns:r="http://schemas.openxmlformats.org/officeDocument/2006/relationships" xmlns:p="http://schemas.openxmlformats.org/presentationml/2006/main">
+  <p:cSld>
+    <p:spTree>
+      <p:nvGrpSpPr>
+        <p:cNvPr id="1" name=""/>
+        <p:cNvGrpSpPr/>
+        <p:nvPr/>
+      </p:nvGrpSpPr>
+      <p:grpSpPr>
+        <a:xfrm>
+          <a:off x="0" y="0"/>
+          <a:ext cx="0" cy="0"/>
+          <a:chOff x="0" y="0"/>
+          <a:chExt cx="0" cy="0"/>
+        </a:xfrm>
+      </p:grpSpPr>
+      <p:sp>
+        <p:nvSpPr>
+          <p:cNvPr id="2" name="Title 1"/>
+          <p:cNvSpPr>
+            <a:spLocks noGrp="1"/>
+          </p:cNvSpPr>
+          <p:nvPr>
+            <p:ph type="title"/>
+          </p:nvPr>
+        </p:nvSpPr>
+        <p:spPr/>
+        <p:txBody>
+          <a:bodyPr/>
+          <a:lstStyle/>
+          <a:p>
+            <a:r>
+              <a:rPr lang="en-US" dirty="0" smtClean="0"/>
+              <a:t>Insights</a:t>
+            </a:r>
+            <a:endParaRPr lang="en-US" dirty="0"/>
+          </a:p>
+        </p:txBody>
+      </p:sp>
+      <p:sp>
+        <p:nvSpPr>
+          <p:cNvPr id="3" name="Content Placeholder 2"/>
+          <p:cNvSpPr>
+            <a:spLocks noGrp="1"/>
+          </p:cNvSpPr>
+          <p:nvPr>
+            <p:ph idx="1"/>
+          </p:nvPr>
+        </p:nvSpPr>
+        <p:spPr/>
+        <p:txBody>
+          <a:bodyPr>
+            <a:normAutofit lnSpcReduction="10000"/>
+          </a:bodyPr>
+          <a:lstStyle/>
+          <a:p>
+            <a:r>
+              <a:rPr lang="en-US" dirty="0" smtClean="0"/>
+              <a:t>Musicians can agree that notes in different registers pose different difficulties on wind instruments, although they may not agree on the magnitude of the difference.</a:t>
+            </a:r>
+          </a:p>
+          <a:p>
+            <a:r>
+              <a:rPr lang="en-US" dirty="0" smtClean="0"/>
+              <a:t>Computing offers us the capability to build upon that insight by relaxing the cognitive load required to measure it.</a:t>
+            </a:r>
+          </a:p>
+          <a:p>
+            <a:r>
+              <a:rPr lang="en-US" dirty="0" smtClean="0"/>
+              <a:t>Educators, performers, professionals, composers, publishers, and more can leverage this technology to simplify their work.</a:t>
+            </a:r>
+            <a:endParaRPr lang="en-US" dirty="0"/>
+          </a:p>
+        </p:txBody>
+      </p:sp>
+    </p:spTree>
+    <p:extLst>
+      <p:ext uri="{BB962C8B-B14F-4D97-AF65-F5344CB8AC3E}">
+        <p14:creationId xmlns:p14="http://schemas.microsoft.com/office/powerpoint/2010/main" val="4080678011"/>
+      </p:ext>
+    </p:extLst>
+  </p:cSld>
+  <p:clrMapOvr>
+    <a:masterClrMapping/>
+  </p:clrMapOvr>
+</p:sld>
+</file>
+
+<file path=ppt/slides/slide4.xml><?xml version="1.0" encoding="utf-8"?>
 <p:sld xmlns:a="http://schemas.openxmlformats.org/drawingml/2006/main" xmlns:r="http://schemas.openxmlformats.org/officeDocument/2006/relationships" xmlns:p="http://schemas.openxmlformats.org/presentationml/2006/main">
   <p:cSld>
     <p:spTree>
@@ -5736,7 +5902,7 @@
 </p:sld>
 </file>
 
-<file path=ppt/slides/slide4.xml><?xml version="1.0" encoding="utf-8"?>
+<file path=ppt/slides/slide5.xml><?xml version="1.0" encoding="utf-8"?>
 <p:sld xmlns:a="http://schemas.openxmlformats.org/drawingml/2006/main" xmlns:r="http://schemas.openxmlformats.org/officeDocument/2006/relationships" xmlns:p="http://schemas.openxmlformats.org/presentationml/2006/main">
   <p:cSld>
     <p:spTree>
@@ -5770,7 +5936,7 @@
           <a:p>
             <a:r>
               <a:rPr lang="en-US" dirty="0" smtClean="0"/>
-              <a:t>Website</a:t>
+              <a:t>Proof of Concept</a:t>
             </a:r>
             <a:endParaRPr lang="en-US" dirty="0"/>
           </a:p>
@@ -5908,7 +6074,7 @@
 </p:sld>
 </file>
 
-<file path=ppt/slides/slide5.xml><?xml version="1.0" encoding="utf-8"?>
+<file path=ppt/slides/slide6.xml><?xml version="1.0" encoding="utf-8"?>
 <p:sld xmlns:a="http://schemas.openxmlformats.org/drawingml/2006/main" xmlns:r="http://schemas.openxmlformats.org/officeDocument/2006/relationships" xmlns:p="http://schemas.openxmlformats.org/presentationml/2006/main">
   <p:cSld>
     <p:spTree>
@@ -5942,7 +6108,7 @@
           <a:p>
             <a:r>
               <a:rPr lang="en-US" dirty="0" smtClean="0"/>
-              <a:t>Results</a:t>
+              <a:t>Contributions</a:t>
             </a:r>
             <a:endParaRPr lang="en-US" dirty="0"/>
           </a:p>
@@ -5966,7 +6132,7 @@
         </p:spPr>
         <p:txBody>
           <a:bodyPr>
-            <a:normAutofit fontScale="92500"/>
+            <a:normAutofit fontScale="92500" lnSpcReduction="20000"/>
           </a:bodyPr>
           <a:lstStyle/>
           <a:p>
@@ -5991,6 +6157,13 @@
             <a:r>
               <a:rPr lang="en-US" dirty="0" smtClean="0"/>
               <a:t>The website automates a meticulous, manual process and provides more consistent results on a ubiquitous platform.</a:t>
+            </a:r>
+          </a:p>
+          <a:p>
+            <a:pPr lvl="1"/>
+            <a:r>
+              <a:rPr lang="en-US" dirty="0" smtClean="0"/>
+              <a:t>Also a proof of concept for future instruments.</a:t>
             </a:r>
           </a:p>
           <a:p>
@@ -6045,7 +6218,7 @@
 </p:sld>
 </file>
 
-<file path=ppt/slides/slide6.xml><?xml version="1.0" encoding="utf-8"?>
+<file path=ppt/slides/slide7.xml><?xml version="1.0" encoding="utf-8"?>
 <p:sld xmlns:a="http://schemas.openxmlformats.org/drawingml/2006/main" xmlns:r="http://schemas.openxmlformats.org/officeDocument/2006/relationships" xmlns:p="http://schemas.openxmlformats.org/presentationml/2006/main">
   <p:cSld>
     <p:spTree>
@@ -6132,7 +6305,7 @@
 </p:sld>
 </file>
 
-<file path=ppt/slides/slide7.xml><?xml version="1.0" encoding="utf-8"?>
+<file path=ppt/slides/slide8.xml><?xml version="1.0" encoding="utf-8"?>
 <p:sld xmlns:a="http://schemas.openxmlformats.org/drawingml/2006/main" xmlns:r="http://schemas.openxmlformats.org/officeDocument/2006/relationships" xmlns:p="http://schemas.openxmlformats.org/presentationml/2006/main">
   <p:cSld>
     <p:spTree>
@@ -6278,7 +6451,7 @@
 </p:sld>
 </file>
 
-<file path=ppt/slides/slide8.xml><?xml version="1.0" encoding="utf-8"?>
+<file path=ppt/slides/slide9.xml><?xml version="1.0" encoding="utf-8"?>
 <p:sld xmlns:a="http://schemas.openxmlformats.org/drawingml/2006/main" xmlns:r="http://schemas.openxmlformats.org/officeDocument/2006/relationships" xmlns:p="http://schemas.openxmlformats.org/presentationml/2006/main">
   <p:cSld>
     <p:spTree>
@@ -6391,147 +6564,6 @@
       </p:par>
     </p:tnLst>
   </p:timing>
-</p:sld>
-</file>
-
-<file path=ppt/slides/slide9.xml><?xml version="1.0" encoding="utf-8"?>
-<p:sld xmlns:a="http://schemas.openxmlformats.org/drawingml/2006/main" xmlns:r="http://schemas.openxmlformats.org/officeDocument/2006/relationships" xmlns:p="http://schemas.openxmlformats.org/presentationml/2006/main">
-  <p:cSld>
-    <p:spTree>
-      <p:nvGrpSpPr>
-        <p:cNvPr id="1" name=""/>
-        <p:cNvGrpSpPr/>
-        <p:nvPr/>
-      </p:nvGrpSpPr>
-      <p:grpSpPr>
-        <a:xfrm>
-          <a:off x="0" y="0"/>
-          <a:ext cx="0" cy="0"/>
-          <a:chOff x="0" y="0"/>
-          <a:chExt cx="0" cy="0"/>
-        </a:xfrm>
-      </p:grpSpPr>
-      <p:sp>
-        <p:nvSpPr>
-          <p:cNvPr id="2" name="Title 1"/>
-          <p:cNvSpPr>
-            <a:spLocks noGrp="1"/>
-          </p:cNvSpPr>
-          <p:nvPr>
-            <p:ph type="title"/>
-          </p:nvPr>
-        </p:nvSpPr>
-        <p:spPr/>
-        <p:txBody>
-          <a:bodyPr/>
-          <a:lstStyle/>
-          <a:p>
-            <a:r>
-              <a:rPr lang="en-US" dirty="0" smtClean="0"/>
-              <a:t>Solution</a:t>
-            </a:r>
-            <a:endParaRPr lang="en-US" dirty="0"/>
-          </a:p>
-        </p:txBody>
-      </p:sp>
-      <p:sp>
-        <p:nvSpPr>
-          <p:cNvPr id="3" name="Content Placeholder 2"/>
-          <p:cNvSpPr>
-            <a:spLocks noGrp="1"/>
-          </p:cNvSpPr>
-          <p:nvPr>
-            <p:ph idx="1"/>
-          </p:nvPr>
-        </p:nvSpPr>
-        <p:spPr/>
-        <p:txBody>
-          <a:bodyPr/>
-          <a:lstStyle/>
-          <a:p>
-            <a:r>
-              <a:rPr lang="en-US" dirty="0" smtClean="0"/>
-              <a:t>Give educators and performers an objective means to quickly determine the complexity of a piece of music relative to their own level of play.</a:t>
-            </a:r>
-          </a:p>
-          <a:p>
-            <a:r>
-              <a:rPr lang="en-US" dirty="0">
-                <a:hlinkClick r:id="rId2"/>
-              </a:rPr>
-              <a:t>http://mickey.cs.vt.edu</a:t>
-            </a:r>
-            <a:r>
-              <a:rPr lang="en-US" dirty="0" smtClean="0">
-                <a:hlinkClick r:id="rId2"/>
-              </a:rPr>
-              <a:t>/</a:t>
-            </a:r>
-            <a:endParaRPr lang="en-US" dirty="0" smtClean="0"/>
-          </a:p>
-          <a:p>
-            <a:r>
-              <a:rPr lang="en-US" dirty="0">
-                <a:hlinkClick r:id="rId3"/>
-              </a:rPr>
-              <a:t>https://github.com/xwsxethan/</a:t>
-            </a:r>
-            <a:r>
-              <a:rPr lang="en-US" dirty="0" smtClean="0">
-                <a:hlinkClick r:id="rId3"/>
-              </a:rPr>
-              <a:t>MusicScoring</a:t>
-            </a:r>
-            <a:endParaRPr lang="en-US" dirty="0" smtClean="0"/>
-          </a:p>
-          <a:p>
-            <a:endParaRPr lang="en-US" dirty="0" smtClean="0"/>
-          </a:p>
-          <a:p>
-            <a:endParaRPr lang="en-US" dirty="0"/>
-          </a:p>
-        </p:txBody>
-      </p:sp>
-      <p:pic>
-        <p:nvPicPr>
-          <p:cNvPr id="4" name="Picture 3" descr="qrcode.27555132.png"/>
-          <p:cNvPicPr>
-            <a:picLocks noChangeAspect="1"/>
-          </p:cNvPicPr>
-          <p:nvPr/>
-        </p:nvPicPr>
-        <p:blipFill>
-          <a:blip r:embed="rId4">
-            <a:extLst>
-              <a:ext uri="{28A0092B-C50C-407E-A947-70E740481C1C}">
-                <a14:useLocalDpi xmlns:a14="http://schemas.microsoft.com/office/drawing/2010/main" val="0"/>
-              </a:ext>
-            </a:extLst>
-          </a:blip>
-          <a:stretch>
-            <a:fillRect/>
-          </a:stretch>
-        </p:blipFill>
-        <p:spPr>
-          <a:xfrm>
-            <a:off x="3672416" y="5038788"/>
-            <a:ext cx="1819212" cy="1819212"/>
-          </a:xfrm>
-          <a:prstGeom prst="rect">
-            <a:avLst/>
-          </a:prstGeom>
-        </p:spPr>
-      </p:pic>
-    </p:spTree>
-    <p:extLst>
-      <p:ext uri="{BB962C8B-B14F-4D97-AF65-F5344CB8AC3E}">
-        <p14:creationId xmlns:p14="http://schemas.microsoft.com/office/powerpoint/2010/main" val="3657676580"/>
-      </p:ext>
-    </p:extLst>
-  </p:cSld>
-  <p:clrMapOvr>
-    <a:masterClrMapping/>
-  </p:clrMapOvr>
 </p:sld>
 </file>
 

</xml_diff>

<commit_message>
Updating slides for thesis dissertation. Still need to do more, but tracking the incremental steps for now.
Related to xwsxethan/MusicScoring#103
</commit_message>
<xml_diff>
--- a/Documents/Thesis/Knapp Meeting.pptx
+++ b/Documents/Thesis/Knapp Meeting.pptx
@@ -12,10 +12,11 @@
     <p:sldId id="271" r:id="rId6"/>
     <p:sldId id="270" r:id="rId7"/>
     <p:sldId id="268" r:id="rId8"/>
-    <p:sldId id="258" r:id="rId9"/>
-    <p:sldId id="259" r:id="rId10"/>
-    <p:sldId id="264" r:id="rId11"/>
-    <p:sldId id="266" r:id="rId12"/>
+    <p:sldId id="273" r:id="rId9"/>
+    <p:sldId id="258" r:id="rId10"/>
+    <p:sldId id="259" r:id="rId11"/>
+    <p:sldId id="264" r:id="rId12"/>
+    <p:sldId id="266" r:id="rId13"/>
   </p:sldIdLst>
   <p:sldSz cx="9144000" cy="6858000" type="screen4x3"/>
   <p:notesSz cx="6858000" cy="9144000"/>
@@ -5190,10 +5191,133 @@
   <p:clrMapOvr>
     <a:masterClrMapping/>
   </p:clrMapOvr>
+  <p:timing>
+    <p:tnLst>
+      <p:par>
+        <p:cTn xmlns:p14="http://schemas.microsoft.com/office/powerpoint/2010/main" id="1" dur="indefinite" restart="never" nodeType="tmRoot"/>
+      </p:par>
+    </p:tnLst>
+  </p:timing>
 </p:sld>
 </file>
 
 <file path=ppt/slides/slide10.xml><?xml version="1.0" encoding="utf-8"?>
+<p:sld xmlns:a="http://schemas.openxmlformats.org/drawingml/2006/main" xmlns:r="http://schemas.openxmlformats.org/officeDocument/2006/relationships" xmlns:p="http://schemas.openxmlformats.org/presentationml/2006/main">
+  <p:cSld>
+    <p:spTree>
+      <p:nvGrpSpPr>
+        <p:cNvPr id="1" name=""/>
+        <p:cNvGrpSpPr/>
+        <p:nvPr/>
+      </p:nvGrpSpPr>
+      <p:grpSpPr>
+        <a:xfrm>
+          <a:off x="0" y="0"/>
+          <a:ext cx="0" cy="0"/>
+          <a:chOff x="0" y="0"/>
+          <a:chExt cx="0" cy="0"/>
+        </a:xfrm>
+      </p:grpSpPr>
+      <p:sp>
+        <p:nvSpPr>
+          <p:cNvPr id="2" name="Title 1"/>
+          <p:cNvSpPr>
+            <a:spLocks noGrp="1"/>
+          </p:cNvSpPr>
+          <p:nvPr>
+            <p:ph type="title"/>
+          </p:nvPr>
+        </p:nvSpPr>
+        <p:spPr/>
+        <p:txBody>
+          <a:bodyPr/>
+          <a:lstStyle/>
+          <a:p>
+            <a:r>
+              <a:rPr lang="en-US" dirty="0" smtClean="0"/>
+              <a:t>Problem</a:t>
+            </a:r>
+            <a:endParaRPr lang="en-US" dirty="0"/>
+          </a:p>
+        </p:txBody>
+      </p:sp>
+      <p:sp>
+        <p:nvSpPr>
+          <p:cNvPr id="3" name="Content Placeholder 2"/>
+          <p:cNvSpPr>
+            <a:spLocks noGrp="1"/>
+          </p:cNvSpPr>
+          <p:nvPr>
+            <p:ph idx="1"/>
+          </p:nvPr>
+        </p:nvSpPr>
+        <p:spPr/>
+        <p:txBody>
+          <a:bodyPr/>
+          <a:lstStyle/>
+          <a:p>
+            <a:r>
+              <a:rPr lang="en-US" dirty="0"/>
+              <a:t>Educators and performers need </a:t>
+            </a:r>
+            <a:r>
+              <a:rPr lang="en-US" dirty="0" smtClean="0"/>
+              <a:t>answers to those questions </a:t>
+            </a:r>
+            <a:r>
+              <a:rPr lang="en-US" dirty="0"/>
+              <a:t>at a glance before they decide to purchase or practice a piece.</a:t>
+            </a:r>
+            <a:endParaRPr lang="en-US" dirty="0" smtClean="0"/>
+          </a:p>
+          <a:p>
+            <a:r>
+              <a:rPr lang="en-US" dirty="0" smtClean="0"/>
+              <a:t>There is currently no objective process for </a:t>
+            </a:r>
+            <a:r>
+              <a:rPr lang="en-US" dirty="0" smtClean="0"/>
+              <a:t>answering these questions.</a:t>
+            </a:r>
+            <a:endParaRPr lang="en-US" dirty="0" smtClean="0"/>
+          </a:p>
+          <a:p>
+            <a:r>
+              <a:rPr lang="en-US" dirty="0" smtClean="0"/>
+              <a:t>Determining </a:t>
+            </a:r>
+            <a:r>
+              <a:rPr lang="en-US" dirty="0" smtClean="0"/>
+              <a:t>the answers </a:t>
+            </a:r>
+            <a:r>
+              <a:rPr lang="en-US" dirty="0" smtClean="0"/>
+              <a:t>for your own playing level is a tedious, error prone process.</a:t>
+            </a:r>
+          </a:p>
+        </p:txBody>
+      </p:sp>
+    </p:spTree>
+    <p:extLst>
+      <p:ext uri="{BB962C8B-B14F-4D97-AF65-F5344CB8AC3E}">
+        <p14:creationId xmlns:p14="http://schemas.microsoft.com/office/powerpoint/2010/main" val="2763426460"/>
+      </p:ext>
+    </p:extLst>
+  </p:cSld>
+  <p:clrMapOvr>
+    <a:masterClrMapping/>
+  </p:clrMapOvr>
+  <p:timing>
+    <p:tnLst>
+      <p:par>
+        <p:cTn xmlns:p14="http://schemas.microsoft.com/office/powerpoint/2010/main" id="1" dur="indefinite" restart="never" nodeType="tmRoot"/>
+      </p:par>
+    </p:tnLst>
+  </p:timing>
+</p:sld>
+</file>
+
+<file path=ppt/slides/slide11.xml><?xml version="1.0" encoding="utf-8"?>
 <p:sld xmlns:a="http://schemas.openxmlformats.org/drawingml/2006/main" xmlns:r="http://schemas.openxmlformats.org/officeDocument/2006/relationships" xmlns:p="http://schemas.openxmlformats.org/presentationml/2006/main">
   <p:cSld>
     <p:spTree>
@@ -5334,7 +5458,7 @@
 </p:sld>
 </file>
 
-<file path=ppt/slides/slide11.xml><?xml version="1.0" encoding="utf-8"?>
+<file path=ppt/slides/slide12.xml><?xml version="1.0" encoding="utf-8"?>
 <p:sld xmlns:a="http://schemas.openxmlformats.org/drawingml/2006/main" xmlns:r="http://schemas.openxmlformats.org/officeDocument/2006/relationships" xmlns:p="http://schemas.openxmlformats.org/presentationml/2006/main">
   <p:cSld>
     <p:spTree>
@@ -5697,12 +5821,23 @@
             <p:ph idx="1"/>
           </p:nvPr>
         </p:nvSpPr>
-        <p:spPr/>
+        <p:spPr>
+          <a:xfrm>
+            <a:off x="739775" y="2770094"/>
+            <a:ext cx="7662864" cy="4087906"/>
+          </a:xfrm>
+        </p:spPr>
         <p:txBody>
           <a:bodyPr>
-            <a:normAutofit lnSpcReduction="10000"/>
+            <a:normAutofit fontScale="92500"/>
           </a:bodyPr>
           <a:lstStyle/>
+          <a:p>
+            <a:endParaRPr lang="en-US" dirty="0" smtClean="0"/>
+          </a:p>
+          <a:p>
+            <a:endParaRPr lang="en-US" dirty="0"/>
+          </a:p>
           <a:p>
             <a:r>
               <a:rPr lang="en-US" dirty="0" smtClean="0"/>
@@ -5721,6 +5856,60 @@
               <a:t>Educators, performers, professionals, composers, publishers, and more can leverage this technology to simplify their work.</a:t>
             </a:r>
             <a:endParaRPr lang="en-US" dirty="0"/>
+          </a:p>
+        </p:txBody>
+      </p:sp>
+      <p:pic>
+        <p:nvPicPr>
+          <p:cNvPr id="4" name="Picture 3"/>
+          <p:cNvPicPr>
+            <a:picLocks noChangeAspect="1"/>
+          </p:cNvPicPr>
+          <p:nvPr/>
+        </p:nvPicPr>
+        <p:blipFill>
+          <a:blip r:embed="rId2"/>
+          <a:stretch>
+            <a:fillRect/>
+          </a:stretch>
+        </p:blipFill>
+        <p:spPr>
+          <a:xfrm>
+            <a:off x="2940267" y="1658291"/>
+            <a:ext cx="3343552" cy="2223605"/>
+          </a:xfrm>
+          <a:prstGeom prst="rect">
+            <a:avLst/>
+          </a:prstGeom>
+        </p:spPr>
+      </p:pic>
+      <p:sp>
+        <p:nvSpPr>
+          <p:cNvPr id="5" name="TextBox 4"/>
+          <p:cNvSpPr txBox="1"/>
+          <p:nvPr/>
+        </p:nvSpPr>
+        <p:spPr>
+          <a:xfrm>
+            <a:off x="6406806" y="2770094"/>
+            <a:ext cx="377544" cy="253916"/>
+          </a:xfrm>
+          <a:prstGeom prst="rect">
+            <a:avLst/>
+          </a:prstGeom>
+          <a:noFill/>
+        </p:spPr>
+        <p:txBody>
+          <a:bodyPr wrap="square" rtlCol="0">
+            <a:spAutoFit/>
+          </a:bodyPr>
+          <a:lstStyle/>
+          <a:p>
+            <a:r>
+              <a:rPr lang="en-US" sz="1050" dirty="0" smtClean="0"/>
+              <a:t>[1]</a:t>
+            </a:r>
+            <a:endParaRPr lang="en-US" sz="1050" dirty="0"/>
           </a:p>
         </p:txBody>
       </p:sp>
@@ -5734,6 +5923,13 @@
   <p:clrMapOvr>
     <a:masterClrMapping/>
   </p:clrMapOvr>
+  <p:timing>
+    <p:tnLst>
+      <p:par>
+        <p:cTn xmlns:p14="http://schemas.microsoft.com/office/powerpoint/2010/main" id="1" dur="indefinite" restart="never" nodeType="tmRoot"/>
+      </p:par>
+    </p:tnLst>
+  </p:timing>
 </p:sld>
 </file>
 
@@ -5899,6 +6095,13 @@
   <p:clrMapOvr>
     <a:masterClrMapping/>
   </p:clrMapOvr>
+  <p:timing>
+    <p:tnLst>
+      <p:par>
+        <p:cTn xmlns:p14="http://schemas.microsoft.com/office/powerpoint/2010/main" id="1" dur="indefinite" restart="never" nodeType="tmRoot"/>
+      </p:par>
+    </p:tnLst>
+  </p:timing>
 </p:sld>
 </file>
 
@@ -6071,6 +6274,13 @@
   <p:clrMapOvr>
     <a:masterClrMapping/>
   </p:clrMapOvr>
+  <p:timing>
+    <p:tnLst>
+      <p:par>
+        <p:cTn xmlns:p14="http://schemas.microsoft.com/office/powerpoint/2010/main" id="1" dur="indefinite" restart="never" nodeType="tmRoot"/>
+      </p:par>
+    </p:tnLst>
+  </p:timing>
 </p:sld>
 </file>
 
@@ -6215,6 +6425,13 @@
   <p:clrMapOvr>
     <a:masterClrMapping/>
   </p:clrMapOvr>
+  <p:timing>
+    <p:tnLst>
+      <p:par>
+        <p:cTn xmlns:p14="http://schemas.microsoft.com/office/powerpoint/2010/main" id="1" dur="indefinite" restart="never" nodeType="tmRoot"/>
+      </p:par>
+    </p:tnLst>
+  </p:timing>
 </p:sld>
 </file>
 
@@ -6302,10 +6519,112 @@
   <p:clrMapOvr>
     <a:masterClrMapping/>
   </p:clrMapOvr>
+  <p:timing>
+    <p:tnLst>
+      <p:par>
+        <p:cTn xmlns:p14="http://schemas.microsoft.com/office/powerpoint/2010/main" id="1" dur="indefinite" restart="never" nodeType="tmRoot"/>
+      </p:par>
+    </p:tnLst>
+  </p:timing>
 </p:sld>
 </file>
 
 <file path=ppt/slides/slide8.xml><?xml version="1.0" encoding="utf-8"?>
+<p:sld xmlns:a="http://schemas.openxmlformats.org/drawingml/2006/main" xmlns:r="http://schemas.openxmlformats.org/officeDocument/2006/relationships" xmlns:p="http://schemas.openxmlformats.org/presentationml/2006/main">
+  <p:cSld>
+    <p:spTree>
+      <p:nvGrpSpPr>
+        <p:cNvPr id="1" name=""/>
+        <p:cNvGrpSpPr/>
+        <p:nvPr/>
+      </p:nvGrpSpPr>
+      <p:grpSpPr>
+        <a:xfrm>
+          <a:off x="0" y="0"/>
+          <a:ext cx="0" cy="0"/>
+          <a:chOff x="0" y="0"/>
+          <a:chExt cx="0" cy="0"/>
+        </a:xfrm>
+      </p:grpSpPr>
+      <p:sp>
+        <p:nvSpPr>
+          <p:cNvPr id="2" name="Title 1"/>
+          <p:cNvSpPr>
+            <a:spLocks noGrp="1"/>
+          </p:cNvSpPr>
+          <p:nvPr>
+            <p:ph type="title"/>
+          </p:nvPr>
+        </p:nvSpPr>
+        <p:spPr/>
+        <p:txBody>
+          <a:bodyPr/>
+          <a:lstStyle/>
+          <a:p>
+            <a:r>
+              <a:rPr lang="en-US" dirty="0" smtClean="0"/>
+              <a:t>Images</a:t>
+            </a:r>
+            <a:endParaRPr lang="en-US" dirty="0"/>
+          </a:p>
+        </p:txBody>
+      </p:sp>
+      <p:sp>
+        <p:nvSpPr>
+          <p:cNvPr id="3" name="Content Placeholder 2"/>
+          <p:cNvSpPr>
+            <a:spLocks noGrp="1"/>
+          </p:cNvSpPr>
+          <p:nvPr>
+            <p:ph idx="1"/>
+          </p:nvPr>
+        </p:nvSpPr>
+        <p:spPr/>
+        <p:txBody>
+          <a:bodyPr/>
+          <a:lstStyle/>
+          <a:p>
+            <a:pPr marL="457200" indent="-457200">
+              <a:buFont typeface="+mj-lt"/>
+              <a:buAutoNum type="arabicPeriod"/>
+            </a:pPr>
+            <a:r>
+              <a:rPr lang="en-US" dirty="0">
+                <a:hlinkClick r:id="rId2"/>
+              </a:rPr>
+              <a:t>http://www.goodfuneralguide.co.uk/wordpress/wp-content/uploads/2013/04/two-cartoon-men-</a:t>
+            </a:r>
+            <a:r>
+              <a:rPr lang="en-US" dirty="0" smtClean="0">
+                <a:hlinkClick r:id="rId2"/>
+              </a:rPr>
+              <a:t>yelling.jpg</a:t>
+            </a:r>
+            <a:endParaRPr lang="en-US" dirty="0" smtClean="0"/>
+          </a:p>
+          <a:p>
+            <a:pPr marL="457200" indent="-457200">
+              <a:buFont typeface="+mj-lt"/>
+              <a:buAutoNum type="arabicPeriod"/>
+            </a:pPr>
+            <a:endParaRPr lang="en-US" dirty="0"/>
+          </a:p>
+        </p:txBody>
+      </p:sp>
+    </p:spTree>
+    <p:extLst>
+      <p:ext uri="{BB962C8B-B14F-4D97-AF65-F5344CB8AC3E}">
+        <p14:creationId xmlns:p14="http://schemas.microsoft.com/office/powerpoint/2010/main" val="2113985035"/>
+      </p:ext>
+    </p:extLst>
+  </p:cSld>
+  <p:clrMapOvr>
+    <a:masterClrMapping/>
+  </p:clrMapOvr>
+</p:sld>
+</file>
+
+<file path=ppt/slides/slide9.xml><?xml version="1.0" encoding="utf-8"?>
 <p:sld xmlns:a="http://schemas.openxmlformats.org/drawingml/2006/main" xmlns:r="http://schemas.openxmlformats.org/officeDocument/2006/relationships" xmlns:p="http://schemas.openxmlformats.org/presentationml/2006/main">
   <p:cSld>
     <p:spTree>
@@ -6435,122 +6754,6 @@
     <p:extLst>
       <p:ext uri="{BB962C8B-B14F-4D97-AF65-F5344CB8AC3E}">
         <p14:creationId xmlns:p14="http://schemas.microsoft.com/office/powerpoint/2010/main" val="3557287677"/>
-      </p:ext>
-    </p:extLst>
-  </p:cSld>
-  <p:clrMapOvr>
-    <a:masterClrMapping/>
-  </p:clrMapOvr>
-  <p:timing>
-    <p:tnLst>
-      <p:par>
-        <p:cTn xmlns:p14="http://schemas.microsoft.com/office/powerpoint/2010/main" id="1" dur="indefinite" restart="never" nodeType="tmRoot"/>
-      </p:par>
-    </p:tnLst>
-  </p:timing>
-</p:sld>
-</file>
-
-<file path=ppt/slides/slide9.xml><?xml version="1.0" encoding="utf-8"?>
-<p:sld xmlns:a="http://schemas.openxmlformats.org/drawingml/2006/main" xmlns:r="http://schemas.openxmlformats.org/officeDocument/2006/relationships" xmlns:p="http://schemas.openxmlformats.org/presentationml/2006/main">
-  <p:cSld>
-    <p:spTree>
-      <p:nvGrpSpPr>
-        <p:cNvPr id="1" name=""/>
-        <p:cNvGrpSpPr/>
-        <p:nvPr/>
-      </p:nvGrpSpPr>
-      <p:grpSpPr>
-        <a:xfrm>
-          <a:off x="0" y="0"/>
-          <a:ext cx="0" cy="0"/>
-          <a:chOff x="0" y="0"/>
-          <a:chExt cx="0" cy="0"/>
-        </a:xfrm>
-      </p:grpSpPr>
-      <p:sp>
-        <p:nvSpPr>
-          <p:cNvPr id="2" name="Title 1"/>
-          <p:cNvSpPr>
-            <a:spLocks noGrp="1"/>
-          </p:cNvSpPr>
-          <p:nvPr>
-            <p:ph type="title"/>
-          </p:nvPr>
-        </p:nvSpPr>
-        <p:spPr/>
-        <p:txBody>
-          <a:bodyPr/>
-          <a:lstStyle/>
-          <a:p>
-            <a:r>
-              <a:rPr lang="en-US" dirty="0" smtClean="0"/>
-              <a:t>Problem</a:t>
-            </a:r>
-            <a:endParaRPr lang="en-US" dirty="0"/>
-          </a:p>
-        </p:txBody>
-      </p:sp>
-      <p:sp>
-        <p:nvSpPr>
-          <p:cNvPr id="3" name="Content Placeholder 2"/>
-          <p:cNvSpPr>
-            <a:spLocks noGrp="1"/>
-          </p:cNvSpPr>
-          <p:nvPr>
-            <p:ph idx="1"/>
-          </p:nvPr>
-        </p:nvSpPr>
-        <p:spPr/>
-        <p:txBody>
-          <a:bodyPr/>
-          <a:lstStyle/>
-          <a:p>
-            <a:r>
-              <a:rPr lang="en-US" dirty="0"/>
-              <a:t>Educators and performers need </a:t>
-            </a:r>
-            <a:r>
-              <a:rPr lang="en-US" dirty="0" smtClean="0"/>
-              <a:t>answers to those questions </a:t>
-            </a:r>
-            <a:r>
-              <a:rPr lang="en-US" dirty="0"/>
-              <a:t>at a glance before they decide to purchase or practice a piece.</a:t>
-            </a:r>
-            <a:endParaRPr lang="en-US" dirty="0" smtClean="0"/>
-          </a:p>
-          <a:p>
-            <a:r>
-              <a:rPr lang="en-US" dirty="0" smtClean="0"/>
-              <a:t>There is currently no objective process for </a:t>
-            </a:r>
-            <a:r>
-              <a:rPr lang="en-US" dirty="0" smtClean="0"/>
-              <a:t>answering these questions.</a:t>
-            </a:r>
-            <a:endParaRPr lang="en-US" dirty="0" smtClean="0"/>
-          </a:p>
-          <a:p>
-            <a:r>
-              <a:rPr lang="en-US" dirty="0" smtClean="0"/>
-              <a:t>Determining </a:t>
-            </a:r>
-            <a:r>
-              <a:rPr lang="en-US" dirty="0" smtClean="0"/>
-              <a:t>the answers </a:t>
-            </a:r>
-            <a:r>
-              <a:rPr lang="en-US" dirty="0" smtClean="0"/>
-              <a:t>for your own playing level is a tedious, error prone process.</a:t>
-            </a:r>
-          </a:p>
-        </p:txBody>
-      </p:sp>
-    </p:spTree>
-    <p:extLst>
-      <p:ext uri="{BB962C8B-B14F-4D97-AF65-F5344CB8AC3E}">
-        <p14:creationId xmlns:p14="http://schemas.microsoft.com/office/powerpoint/2010/main" val="2763426460"/>
       </p:ext>
     </p:extLst>
   </p:cSld>

</xml_diff>